<commit_message>
add 'vanilla' in title of EvoStar presentation
</commit_message>
<xml_diff>
--- a/assets/ppt/EvoStarPpt.pptx
+++ b/assets/ppt/EvoStarPpt.pptx
@@ -326,7 +326,7 @@
           <a:p>
             <a:fld id="{004A8D02-4E65-4CCD-8312-4AB164C6C77D}" type="datetimeFigureOut">
               <a:rPr lang="en-US"/>
-              <a:t>24-Apr-17</a:t>
+              <a:t>25-Apr-17</a:t>
             </a:fld>
             <a:endParaRPr/>
           </a:p>
@@ -491,7 +491,7 @@
           <a:p>
             <a:fld id="{67A755D9-D361-47B8-9652-3B4EA9776CE5}" type="datetimeFigureOut">
               <a:rPr lang="en-US"/>
-              <a:t>24-Apr-17</a:t>
+              <a:t>25-Apr-17</a:t>
             </a:fld>
             <a:endParaRPr/>
           </a:p>
@@ -1954,7 +1954,7 @@
           <a:effectLst/>
           <a:extLst>
             <a:ext uri="{91240B29-F687-4f45-9708-019B960494DF}">
-              <a14:hiddenLine xmlns="" xmlns:a14="http://schemas.microsoft.com/office/drawing/2010/main" w="9525">
+              <a14:hiddenLine xmlns:a14="http://schemas.microsoft.com/office/drawing/2010/main" xmlns="" w="9525">
                 <a:solidFill>
                   <a:srgbClr val="000000"/>
                 </a:solidFill>
@@ -2146,7 +2146,7 @@
           <a:p>
             <a:fld id="{A78D0209-E955-4676-836C-7E6D4F30BAA2}" type="datetime1">
               <a:rPr lang="en-US" smtClean="0"/>
-              <a:t>24-Apr-17</a:t>
+              <a:t>25-Apr-17</a:t>
             </a:fld>
             <a:endParaRPr lang="en-US"/>
           </a:p>
@@ -2483,7 +2483,7 @@
           <a:p>
             <a:fld id="{43687F8D-C034-4668-A5A6-D87C96B1ADE5}" type="datetime1">
               <a:rPr lang="en-US" smtClean="0"/>
-              <a:t>24-Apr-17</a:t>
+              <a:t>25-Apr-17</a:t>
             </a:fld>
             <a:endParaRPr lang="en-US"/>
           </a:p>
@@ -2979,7 +2979,7 @@
           <a:p>
             <a:fld id="{F8DE8C64-7416-4009-8F83-9277C6E686DD}" type="datetime1">
               <a:rPr lang="en-US" smtClean="0"/>
-              <a:t>24-Apr-17</a:t>
+              <a:t>25-Apr-17</a:t>
             </a:fld>
             <a:endParaRPr lang="en-US"/>
           </a:p>
@@ -3356,7 +3356,7 @@
           <a:p>
             <a:fld id="{2DFD223F-5BC8-4160-B7B9-3B3BE209C8B9}" type="datetime1">
               <a:rPr lang="en-US" smtClean="0"/>
-              <a:t>24-Apr-17</a:t>
+              <a:t>25-Apr-17</a:t>
             </a:fld>
             <a:endParaRPr lang="en-US"/>
           </a:p>
@@ -3519,7 +3519,7 @@
           <a:ln/>
           <a:extLst>
             <a:ext uri="{91240B29-F687-4f45-9708-019B960494DF}">
-              <a14:hiddenLine xmlns="" xmlns:a14="http://schemas.microsoft.com/office/drawing/2010/main" w="9525">
+              <a14:hiddenLine xmlns:a14="http://schemas.microsoft.com/office/drawing/2010/main" xmlns="" w="9525">
                 <a:solidFill>
                   <a:srgbClr val="000000"/>
                 </a:solidFill>
@@ -3637,7 +3637,7 @@
           <a:p>
             <a:fld id="{8AB54153-C3DF-446B-A7CE-4D3B940E6559}" type="datetime1">
               <a:rPr lang="en-US" smtClean="0"/>
-              <a:t>24-Apr-17</a:t>
+              <a:t>25-Apr-17</a:t>
             </a:fld>
             <a:endParaRPr lang="en-US"/>
           </a:p>
@@ -3813,7 +3813,7 @@
           <a:ln/>
           <a:extLst>
             <a:ext uri="{91240B29-F687-4f45-9708-019B960494DF}">
-              <a14:hiddenLine xmlns="" xmlns:a14="http://schemas.microsoft.com/office/drawing/2010/main" w="9525">
+              <a14:hiddenLine xmlns:a14="http://schemas.microsoft.com/office/drawing/2010/main" xmlns="" w="9525">
                 <a:solidFill>
                   <a:srgbClr val="000000"/>
                 </a:solidFill>
@@ -3941,7 +3941,7 @@
           <a:p>
             <a:fld id="{DD9A66D5-5C23-482C-A114-AC381B9EF87A}" type="datetime1">
               <a:rPr lang="en-US" smtClean="0"/>
-              <a:t>24-Apr-17</a:t>
+              <a:t>25-Apr-17</a:t>
             </a:fld>
             <a:endParaRPr lang="en-US"/>
           </a:p>
@@ -4115,7 +4115,7 @@
           <a:ln/>
           <a:extLst>
             <a:ext uri="{91240B29-F687-4f45-9708-019B960494DF}">
-              <a14:hiddenLine xmlns="" xmlns:a14="http://schemas.microsoft.com/office/drawing/2010/main" w="9525">
+              <a14:hiddenLine xmlns:a14="http://schemas.microsoft.com/office/drawing/2010/main" xmlns="" w="9525">
                 <a:solidFill>
                   <a:srgbClr val="000000"/>
                 </a:solidFill>
@@ -4243,7 +4243,7 @@
           <a:p>
             <a:fld id="{214B4DD4-429E-490E-ACFD-1036D0EC4644}" type="datetime1">
               <a:rPr lang="en-US" smtClean="0"/>
-              <a:t>24-Apr-17</a:t>
+              <a:t>25-Apr-17</a:t>
             </a:fld>
             <a:endParaRPr lang="en-US"/>
           </a:p>
@@ -4605,7 +4605,7 @@
           <a:p>
             <a:fld id="{3F66C814-676A-400A-8BE1-443D6DA0CDFA}" type="datetime1">
               <a:rPr lang="en-US" smtClean="0"/>
-              <a:t>24-Apr-17</a:t>
+              <a:t>25-Apr-17</a:t>
             </a:fld>
             <a:endParaRPr lang="en-US"/>
           </a:p>
@@ -4779,7 +4779,7 @@
           <a:ln/>
           <a:extLst>
             <a:ext uri="{91240B29-F687-4f45-9708-019B960494DF}">
-              <a14:hiddenLine xmlns="" xmlns:a14="http://schemas.microsoft.com/office/drawing/2010/main" w="9525">
+              <a14:hiddenLine xmlns:a14="http://schemas.microsoft.com/office/drawing/2010/main" xmlns="" w="9525">
                 <a:solidFill>
                   <a:srgbClr val="000000"/>
                 </a:solidFill>
@@ -4963,7 +4963,7 @@
           <a:p>
             <a:fld id="{3C9CA9CE-C992-452A-BEDA-D43A4F0FBBE7}" type="datetime1">
               <a:rPr lang="en-US" smtClean="0"/>
-              <a:t>24-Apr-17</a:t>
+              <a:t>25-Apr-17</a:t>
             </a:fld>
             <a:endParaRPr lang="en-US"/>
           </a:p>
@@ -5137,7 +5137,7 @@
           <a:ln/>
           <a:extLst>
             <a:ext uri="{91240B29-F687-4f45-9708-019B960494DF}">
-              <a14:hiddenLine xmlns="" xmlns:a14="http://schemas.microsoft.com/office/drawing/2010/main" w="9525">
+              <a14:hiddenLine xmlns:a14="http://schemas.microsoft.com/office/drawing/2010/main" xmlns="" w="9525">
                 <a:solidFill>
                   <a:srgbClr val="000000"/>
                 </a:solidFill>
@@ -5459,7 +5459,7 @@
           <a:p>
             <a:fld id="{5FAB20CB-64B0-45AC-9192-7A40DA98BB24}" type="datetime1">
               <a:rPr lang="en-US" smtClean="0"/>
-              <a:t>24-Apr-17</a:t>
+              <a:t>25-Apr-17</a:t>
             </a:fld>
             <a:endParaRPr lang="en-US"/>
           </a:p>
@@ -5633,7 +5633,7 @@
           <a:ln/>
           <a:extLst>
             <a:ext uri="{91240B29-F687-4f45-9708-019B960494DF}">
-              <a14:hiddenLine xmlns="" xmlns:a14="http://schemas.microsoft.com/office/drawing/2010/main" w="9525">
+              <a14:hiddenLine xmlns:a14="http://schemas.microsoft.com/office/drawing/2010/main" xmlns="" w="9525">
                 <a:solidFill>
                   <a:srgbClr val="000000"/>
                 </a:solidFill>
@@ -5699,7 +5699,7 @@
           <a:p>
             <a:fld id="{A72FE8DC-781D-40E0-98A5-BC5D1D7AAFC8}" type="datetime1">
               <a:rPr lang="en-US" smtClean="0"/>
-              <a:t>24-Apr-17</a:t>
+              <a:t>25-Apr-17</a:t>
             </a:fld>
             <a:endParaRPr lang="en-US"/>
           </a:p>
@@ -5813,7 +5813,7 @@
           <a:p>
             <a:fld id="{659B5AF6-F63E-4B50-91B0-4410CDF13489}" type="datetime1">
               <a:rPr lang="en-US" smtClean="0"/>
-              <a:t>24-Apr-17</a:t>
+              <a:t>25-Apr-17</a:t>
             </a:fld>
             <a:endParaRPr lang="en-US"/>
           </a:p>
@@ -6100,7 +6100,7 @@
           <a:ln/>
           <a:extLst>
             <a:ext uri="{91240B29-F687-4f45-9708-019B960494DF}">
-              <a14:hiddenLine xmlns="" xmlns:a14="http://schemas.microsoft.com/office/drawing/2010/main" w="9525">
+              <a14:hiddenLine xmlns:a14="http://schemas.microsoft.com/office/drawing/2010/main" xmlns="" w="9525">
                 <a:solidFill>
                   <a:srgbClr val="000000"/>
                 </a:solidFill>
@@ -6299,7 +6299,7 @@
           <a:p>
             <a:fld id="{F3FDC9F4-3151-4A58-AA82-7A5CF9AFC171}" type="datetime1">
               <a:rPr lang="en-US" smtClean="0"/>
-              <a:t>24-Apr-17</a:t>
+              <a:t>25-Apr-17</a:t>
             </a:fld>
             <a:endParaRPr lang="en-US"/>
           </a:p>
@@ -6632,7 +6632,7 @@
           <a:p>
             <a:fld id="{A248CAC1-FF20-4EC7-98AE-256C5377DB6D}" type="datetime1">
               <a:rPr lang="en-US" smtClean="0"/>
-              <a:t>24-Apr-17</a:t>
+              <a:t>25-Apr-17</a:t>
             </a:fld>
             <a:endParaRPr lang="en-US" dirty="0"/>
           </a:p>
@@ -6941,7 +6941,7 @@
           <a:p>
             <a:fld id="{BD9DB032-828F-4FE8-90F5-8D3B0316A3FF}" type="datetime1">
               <a:rPr lang="en-US" smtClean="0"/>
-              <a:t>24-Apr-17</a:t>
+              <a:t>25-Apr-17</a:t>
             </a:fld>
             <a:endParaRPr lang="en-US"/>
           </a:p>
@@ -7428,7 +7428,15 @@
           <a:p>
             <a:r>
               <a:rPr lang="en-US" dirty="0" smtClean="0"/>
-              <a:t>Analysis of Rolling Horizon Evolution Parameters in General Video Game Playing</a:t>
+              <a:t>Analysis of </a:t>
+            </a:r>
+            <a:r>
+              <a:rPr lang="en-US" dirty="0" smtClean="0"/>
+              <a:t>Vanilla Rolling </a:t>
+            </a:r>
+            <a:r>
+              <a:rPr lang="en-US" dirty="0" smtClean="0"/>
+              <a:t>Horizon Evolution Parameters in General Video Game Playing</a:t>
             </a:r>
             <a:endParaRPr lang="en-US" dirty="0"/>
           </a:p>
@@ -10092,49 +10100,49 @@
                 <a:gridCol w="1404258">
                   <a:extLst>
                     <a:ext uri="{9D8B030D-6E8A-4147-A177-3AD203B41FA5}">
-                      <a16:colId xmlns:a16="http://schemas.microsoft.com/office/drawing/2014/main" xmlns="" val="2370910472"/>
+                      <a16:colId xmlns="" xmlns:a16="http://schemas.microsoft.com/office/drawing/2014/main" val="2370910472"/>
                     </a:ext>
                   </a:extLst>
                 </a:gridCol>
                 <a:gridCol w="1699889">
                   <a:extLst>
                     <a:ext uri="{9D8B030D-6E8A-4147-A177-3AD203B41FA5}">
-                      <a16:colId xmlns:a16="http://schemas.microsoft.com/office/drawing/2014/main" xmlns="" val="1322113429"/>
+                      <a16:colId xmlns="" xmlns:a16="http://schemas.microsoft.com/office/drawing/2014/main" val="1322113429"/>
                     </a:ext>
                   </a:extLst>
                 </a:gridCol>
                 <a:gridCol w="1034716">
                   <a:extLst>
                     <a:ext uri="{9D8B030D-6E8A-4147-A177-3AD203B41FA5}">
-                      <a16:colId xmlns:a16="http://schemas.microsoft.com/office/drawing/2014/main" xmlns="" val="3081790763"/>
+                      <a16:colId xmlns="" xmlns:a16="http://schemas.microsoft.com/office/drawing/2014/main" val="3081790763"/>
                     </a:ext>
                   </a:extLst>
                 </a:gridCol>
                 <a:gridCol w="1759016">
                   <a:extLst>
                     <a:ext uri="{9D8B030D-6E8A-4147-A177-3AD203B41FA5}">
-                      <a16:colId xmlns:a16="http://schemas.microsoft.com/office/drawing/2014/main" xmlns="" val="2156366289"/>
+                      <a16:colId xmlns="" xmlns:a16="http://schemas.microsoft.com/office/drawing/2014/main" val="2156366289"/>
                     </a:ext>
                   </a:extLst>
                 </a:gridCol>
                 <a:gridCol w="1034716">
                   <a:extLst>
                     <a:ext uri="{9D8B030D-6E8A-4147-A177-3AD203B41FA5}">
-                      <a16:colId xmlns:a16="http://schemas.microsoft.com/office/drawing/2014/main" xmlns="" val="1539075843"/>
+                      <a16:colId xmlns="" xmlns:a16="http://schemas.microsoft.com/office/drawing/2014/main" val="1539075843"/>
                     </a:ext>
                   </a:extLst>
                 </a:gridCol>
                 <a:gridCol w="1759016">
                   <a:extLst>
                     <a:ext uri="{9D8B030D-6E8A-4147-A177-3AD203B41FA5}">
-                      <a16:colId xmlns:a16="http://schemas.microsoft.com/office/drawing/2014/main" xmlns="" val="3831150246"/>
+                      <a16:colId xmlns="" xmlns:a16="http://schemas.microsoft.com/office/drawing/2014/main" val="3831150246"/>
                     </a:ext>
                   </a:extLst>
                 </a:gridCol>
                 <a:gridCol w="1138190">
                   <a:extLst>
                     <a:ext uri="{9D8B030D-6E8A-4147-A177-3AD203B41FA5}">
-                      <a16:colId xmlns:a16="http://schemas.microsoft.com/office/drawing/2014/main" xmlns="" val="643805457"/>
+                      <a16:colId xmlns="" xmlns:a16="http://schemas.microsoft.com/office/drawing/2014/main" val="643805457"/>
                     </a:ext>
                   </a:extLst>
                 </a:gridCol>
@@ -10303,7 +10311,7 @@
                 </a:tc>
                 <a:extLst>
                   <a:ext uri="{0D108BD9-81ED-4DB2-BD59-A6C34878D82A}">
-                    <a16:rowId xmlns:a16="http://schemas.microsoft.com/office/drawing/2014/main" xmlns="" val="1428175324"/>
+                    <a16:rowId xmlns="" xmlns:a16="http://schemas.microsoft.com/office/drawing/2014/main" val="1428175324"/>
                   </a:ext>
                 </a:extLst>
               </a:tr>
@@ -10471,7 +10479,7 @@
                 </a:tc>
                 <a:extLst>
                   <a:ext uri="{0D108BD9-81ED-4DB2-BD59-A6C34878D82A}">
-                    <a16:rowId xmlns:a16="http://schemas.microsoft.com/office/drawing/2014/main" xmlns="" val="2602919636"/>
+                    <a16:rowId xmlns="" xmlns:a16="http://schemas.microsoft.com/office/drawing/2014/main" val="2602919636"/>
                   </a:ext>
                 </a:extLst>
               </a:tr>
@@ -10639,7 +10647,7 @@
                 </a:tc>
                 <a:extLst>
                   <a:ext uri="{0D108BD9-81ED-4DB2-BD59-A6C34878D82A}">
-                    <a16:rowId xmlns:a16="http://schemas.microsoft.com/office/drawing/2014/main" xmlns="" val="1221055352"/>
+                    <a16:rowId xmlns="" xmlns:a16="http://schemas.microsoft.com/office/drawing/2014/main" val="1221055352"/>
                   </a:ext>
                 </a:extLst>
               </a:tr>
@@ -10807,7 +10815,7 @@
                 </a:tc>
                 <a:extLst>
                   <a:ext uri="{0D108BD9-81ED-4DB2-BD59-A6C34878D82A}">
-                    <a16:rowId xmlns:a16="http://schemas.microsoft.com/office/drawing/2014/main" xmlns="" val="2249866853"/>
+                    <a16:rowId xmlns="" xmlns:a16="http://schemas.microsoft.com/office/drawing/2014/main" val="2249866853"/>
                   </a:ext>
                 </a:extLst>
               </a:tr>
@@ -11017,7 +11025,7 @@
                 </a:tc>
                 <a:extLst>
                   <a:ext uri="{0D108BD9-81ED-4DB2-BD59-A6C34878D82A}">
-                    <a16:rowId xmlns:a16="http://schemas.microsoft.com/office/drawing/2014/main" xmlns="" val="1120451883"/>
+                    <a16:rowId xmlns="" xmlns:a16="http://schemas.microsoft.com/office/drawing/2014/main" val="1120451883"/>
                   </a:ext>
                 </a:extLst>
               </a:tr>
@@ -11974,28 +11982,28 @@
                 <a:gridCol w="1276350">
                   <a:extLst>
                     <a:ext uri="{9D8B030D-6E8A-4147-A177-3AD203B41FA5}">
-                      <a16:colId xmlns:a16="http://schemas.microsoft.com/office/drawing/2014/main" xmlns="" val="3870711811"/>
+                      <a16:colId xmlns="" xmlns:a16="http://schemas.microsoft.com/office/drawing/2014/main" val="3870711811"/>
                     </a:ext>
                   </a:extLst>
                 </a:gridCol>
                 <a:gridCol w="1276350">
                   <a:extLst>
                     <a:ext uri="{9D8B030D-6E8A-4147-A177-3AD203B41FA5}">
-                      <a16:colId xmlns:a16="http://schemas.microsoft.com/office/drawing/2014/main" xmlns="" val="3069796750"/>
+                      <a16:colId xmlns="" xmlns:a16="http://schemas.microsoft.com/office/drawing/2014/main" val="3069796750"/>
                     </a:ext>
                   </a:extLst>
                 </a:gridCol>
                 <a:gridCol w="1276350">
                   <a:extLst>
                     <a:ext uri="{9D8B030D-6E8A-4147-A177-3AD203B41FA5}">
-                      <a16:colId xmlns:a16="http://schemas.microsoft.com/office/drawing/2014/main" xmlns="" val="4039207894"/>
+                      <a16:colId xmlns="" xmlns:a16="http://schemas.microsoft.com/office/drawing/2014/main" val="4039207894"/>
                     </a:ext>
                   </a:extLst>
                 </a:gridCol>
                 <a:gridCol w="1276350">
                   <a:extLst>
                     <a:ext uri="{9D8B030D-6E8A-4147-A177-3AD203B41FA5}">
-                      <a16:colId xmlns:a16="http://schemas.microsoft.com/office/drawing/2014/main" xmlns="" val="1908756294"/>
+                      <a16:colId xmlns="" xmlns:a16="http://schemas.microsoft.com/office/drawing/2014/main" val="1908756294"/>
                     </a:ext>
                   </a:extLst>
                 </a:gridCol>
@@ -12091,7 +12099,7 @@
                 </a:tc>
                 <a:extLst>
                   <a:ext uri="{0D108BD9-81ED-4DB2-BD59-A6C34878D82A}">
-                    <a16:rowId xmlns:a16="http://schemas.microsoft.com/office/drawing/2014/main" xmlns="" val="3425662472"/>
+                    <a16:rowId xmlns="" xmlns:a16="http://schemas.microsoft.com/office/drawing/2014/main" val="3425662472"/>
                   </a:ext>
                 </a:extLst>
               </a:tr>
@@ -12228,7 +12236,7 @@
                 </a:tc>
                 <a:extLst>
                   <a:ext uri="{0D108BD9-81ED-4DB2-BD59-A6C34878D82A}">
-                    <a16:rowId xmlns:a16="http://schemas.microsoft.com/office/drawing/2014/main" xmlns="" val="1224693227"/>
+                    <a16:rowId xmlns="" xmlns:a16="http://schemas.microsoft.com/office/drawing/2014/main" val="1224693227"/>
                   </a:ext>
                 </a:extLst>
               </a:tr>
@@ -12368,7 +12376,7 @@
                 </a:tc>
                 <a:extLst>
                   <a:ext uri="{0D108BD9-81ED-4DB2-BD59-A6C34878D82A}">
-                    <a16:rowId xmlns:a16="http://schemas.microsoft.com/office/drawing/2014/main" xmlns="" val="4249664512"/>
+                    <a16:rowId xmlns="" xmlns:a16="http://schemas.microsoft.com/office/drawing/2014/main" val="4249664512"/>
                   </a:ext>
                 </a:extLst>
               </a:tr>
@@ -12508,7 +12516,7 @@
                 </a:tc>
                 <a:extLst>
                   <a:ext uri="{0D108BD9-81ED-4DB2-BD59-A6C34878D82A}">
-                    <a16:rowId xmlns:a16="http://schemas.microsoft.com/office/drawing/2014/main" xmlns="" val="2376095545"/>
+                    <a16:rowId xmlns="" xmlns:a16="http://schemas.microsoft.com/office/drawing/2014/main" val="2376095545"/>
                   </a:ext>
                 </a:extLst>
               </a:tr>
@@ -12657,7 +12665,7 @@
                 </a:tc>
                 <a:extLst>
                   <a:ext uri="{0D108BD9-81ED-4DB2-BD59-A6C34878D82A}">
-                    <a16:rowId xmlns:a16="http://schemas.microsoft.com/office/drawing/2014/main" xmlns="" val="3305879373"/>
+                    <a16:rowId xmlns="" xmlns:a16="http://schemas.microsoft.com/office/drawing/2014/main" val="3305879373"/>
                   </a:ext>
                 </a:extLst>
               </a:tr>
@@ -12818,7 +12826,7 @@
                 </a:tc>
                 <a:extLst>
                   <a:ext uri="{0D108BD9-81ED-4DB2-BD59-A6C34878D82A}">
-                    <a16:rowId xmlns:a16="http://schemas.microsoft.com/office/drawing/2014/main" xmlns="" val="3566786093"/>
+                    <a16:rowId xmlns="" xmlns:a16="http://schemas.microsoft.com/office/drawing/2014/main" val="3566786093"/>
                   </a:ext>
                 </a:extLst>
               </a:tr>
@@ -12967,7 +12975,7 @@
                 </a:tc>
                 <a:extLst>
                   <a:ext uri="{0D108BD9-81ED-4DB2-BD59-A6C34878D82A}">
-                    <a16:rowId xmlns:a16="http://schemas.microsoft.com/office/drawing/2014/main" xmlns="" val="3704206994"/>
+                    <a16:rowId xmlns="" xmlns:a16="http://schemas.microsoft.com/office/drawing/2014/main" val="3704206994"/>
                   </a:ext>
                 </a:extLst>
               </a:tr>
@@ -13116,7 +13124,7 @@
                 </a:tc>
                 <a:extLst>
                   <a:ext uri="{0D108BD9-81ED-4DB2-BD59-A6C34878D82A}">
-                    <a16:rowId xmlns:a16="http://schemas.microsoft.com/office/drawing/2014/main" xmlns="" val="3889623771"/>
+                    <a16:rowId xmlns="" xmlns:a16="http://schemas.microsoft.com/office/drawing/2014/main" val="3889623771"/>
                   </a:ext>
                 </a:extLst>
               </a:tr>
@@ -13277,7 +13285,7 @@
                 </a:tc>
                 <a:extLst>
                   <a:ext uri="{0D108BD9-81ED-4DB2-BD59-A6C34878D82A}">
-                    <a16:rowId xmlns:a16="http://schemas.microsoft.com/office/drawing/2014/main" xmlns="" val="1993547095"/>
+                    <a16:rowId xmlns="" xmlns:a16="http://schemas.microsoft.com/office/drawing/2014/main" val="1993547095"/>
                   </a:ext>
                 </a:extLst>
               </a:tr>
@@ -13393,7 +13401,7 @@
                 </a:tc>
                 <a:extLst>
                   <a:ext uri="{0D108BD9-81ED-4DB2-BD59-A6C34878D82A}">
-                    <a16:rowId xmlns:a16="http://schemas.microsoft.com/office/drawing/2014/main" xmlns="" val="2917308227"/>
+                    <a16:rowId xmlns="" xmlns:a16="http://schemas.microsoft.com/office/drawing/2014/main" val="2917308227"/>
                   </a:ext>
                 </a:extLst>
               </a:tr>
@@ -13527,7 +13535,7 @@
                 </a:tc>
                 <a:extLst>
                   <a:ext uri="{0D108BD9-81ED-4DB2-BD59-A6C34878D82A}">
-                    <a16:rowId xmlns:a16="http://schemas.microsoft.com/office/drawing/2014/main" xmlns="" val="2346907269"/>
+                    <a16:rowId xmlns="" xmlns:a16="http://schemas.microsoft.com/office/drawing/2014/main" val="2346907269"/>
                   </a:ext>
                 </a:extLst>
               </a:tr>

</xml_diff>